<commit_message>
Adjust redirect routes for after delete
</commit_message>
<xml_diff>
--- a/presentation/presentation.pptx
+++ b/presentation/presentation.pptx
@@ -13,6 +13,10 @@
     <p:sldId id="261" r:id="rId7"/>
     <p:sldId id="262" r:id="rId8"/>
     <p:sldId id="263" r:id="rId9"/>
+    <p:sldId id="264" r:id="rId10"/>
+    <p:sldId id="265" r:id="rId11"/>
+    <p:sldId id="266" r:id="rId12"/>
+    <p:sldId id="268" r:id="rId13"/>
   </p:sldIdLst>
   <p:sldSz cx="12192000" cy="6858000"/>
   <p:notesSz cx="6858000" cy="9144000"/>
@@ -5586,6 +5590,543 @@
 </p:sld>
 </file>
 
+<file path=ppt/slides/slide10.xml><?xml version="1.0" encoding="utf-8"?>
+<p:sld xmlns:a="http://schemas.openxmlformats.org/drawingml/2006/main" xmlns:r="http://schemas.openxmlformats.org/officeDocument/2006/relationships" xmlns:p="http://schemas.openxmlformats.org/presentationml/2006/main">
+  <p:cSld>
+    <p:spTree>
+      <p:nvGrpSpPr>
+        <p:cNvPr id="1" name=""/>
+        <p:cNvGrpSpPr/>
+        <p:nvPr/>
+      </p:nvGrpSpPr>
+      <p:grpSpPr>
+        <a:xfrm>
+          <a:off x="0" y="0"/>
+          <a:ext cx="0" cy="0"/>
+          <a:chOff x="0" y="0"/>
+          <a:chExt cx="0" cy="0"/>
+        </a:xfrm>
+      </p:grpSpPr>
+      <p:sp>
+        <p:nvSpPr>
+          <p:cNvPr id="8" name="Title 1">
+            <a:extLst>
+              <a:ext uri="{FF2B5EF4-FFF2-40B4-BE49-F238E27FC236}">
+                <a16:creationId xmlns:a16="http://schemas.microsoft.com/office/drawing/2014/main" id="{0BCDD50F-E0A2-46A4-825F-ADA7455816C7}"/>
+              </a:ext>
+            </a:extLst>
+          </p:cNvPr>
+          <p:cNvSpPr txBox="1">
+            <a:spLocks/>
+          </p:cNvSpPr>
+          <p:nvPr/>
+        </p:nvSpPr>
+        <p:spPr>
+          <a:xfrm>
+            <a:off x="227012" y="208822"/>
+            <a:ext cx="8001000" cy="1695450"/>
+          </a:xfrm>
+          <a:prstGeom prst="rect">
+            <a:avLst/>
+          </a:prstGeom>
+          <a:effectLst/>
+        </p:spPr>
+        <p:txBody>
+          <a:bodyPr vert="horz" lIns="91440" tIns="45720" rIns="91440" bIns="45720" rtlCol="0" anchor="t">
+            <a:normAutofit/>
+          </a:bodyPr>
+          <a:lstStyle>
+            <a:lvl1pPr algn="l" defTabSz="457200" rtl="0" eaLnBrk="1" latinLnBrk="0" hangingPunct="1">
+              <a:spcBef>
+                <a:spcPct val="0"/>
+              </a:spcBef>
+              <a:buNone/>
+              <a:defRPr sz="3600" kern="1200" cap="all">
+                <a:ln w="3175" cmpd="sng">
+                  <a:noFill/>
+                </a:ln>
+                <a:solidFill>
+                  <a:schemeClr val="tx1"/>
+                </a:solidFill>
+                <a:effectLst/>
+                <a:latin typeface="+mj-lt"/>
+                <a:ea typeface="+mj-ea"/>
+                <a:cs typeface="+mj-cs"/>
+              </a:defRPr>
+            </a:lvl1pPr>
+            <a:lvl2pPr eaLnBrk="1" hangingPunct="1">
+              <a:defRPr>
+                <a:solidFill>
+                  <a:schemeClr val="tx2"/>
+                </a:solidFill>
+              </a:defRPr>
+            </a:lvl2pPr>
+            <a:lvl3pPr eaLnBrk="1" hangingPunct="1">
+              <a:defRPr>
+                <a:solidFill>
+                  <a:schemeClr val="tx2"/>
+                </a:solidFill>
+              </a:defRPr>
+            </a:lvl3pPr>
+            <a:lvl4pPr eaLnBrk="1" hangingPunct="1">
+              <a:defRPr>
+                <a:solidFill>
+                  <a:schemeClr val="tx2"/>
+                </a:solidFill>
+              </a:defRPr>
+            </a:lvl4pPr>
+            <a:lvl5pPr eaLnBrk="1" hangingPunct="1">
+              <a:defRPr>
+                <a:solidFill>
+                  <a:schemeClr val="tx2"/>
+                </a:solidFill>
+              </a:defRPr>
+            </a:lvl5pPr>
+            <a:lvl6pPr eaLnBrk="1" hangingPunct="1">
+              <a:defRPr>
+                <a:solidFill>
+                  <a:schemeClr val="tx2"/>
+                </a:solidFill>
+              </a:defRPr>
+            </a:lvl6pPr>
+            <a:lvl7pPr eaLnBrk="1" hangingPunct="1">
+              <a:defRPr>
+                <a:solidFill>
+                  <a:schemeClr val="tx2"/>
+                </a:solidFill>
+              </a:defRPr>
+            </a:lvl7pPr>
+            <a:lvl8pPr eaLnBrk="1" hangingPunct="1">
+              <a:defRPr>
+                <a:solidFill>
+                  <a:schemeClr val="tx2"/>
+                </a:solidFill>
+              </a:defRPr>
+            </a:lvl8pPr>
+            <a:lvl9pPr eaLnBrk="1" hangingPunct="1">
+              <a:defRPr>
+                <a:solidFill>
+                  <a:schemeClr val="tx2"/>
+                </a:solidFill>
+              </a:defRPr>
+            </a:lvl9pPr>
+          </a:lstStyle>
+          <a:p>
+            <a:r>
+              <a:rPr lang="tr-TR" sz="4400" b="1" dirty="0"/>
+              <a:t>SCREENSHOTS</a:t>
+            </a:r>
+            <a:endParaRPr lang="tr-TR" sz="4800" b="1" dirty="0"/>
+          </a:p>
+        </p:txBody>
+      </p:sp>
+      <p:pic>
+        <p:nvPicPr>
+          <p:cNvPr id="3" name="Picture 2">
+            <a:extLst>
+              <a:ext uri="{FF2B5EF4-FFF2-40B4-BE49-F238E27FC236}">
+                <a16:creationId xmlns:a16="http://schemas.microsoft.com/office/drawing/2014/main" id="{B7F8B81C-CF44-4AA0-8D9C-35877859D7FC}"/>
+              </a:ext>
+            </a:extLst>
+          </p:cNvPr>
+          <p:cNvPicPr>
+            <a:picLocks noChangeAspect="1"/>
+          </p:cNvPicPr>
+          <p:nvPr/>
+        </p:nvPicPr>
+        <p:blipFill>
+          <a:blip r:embed="rId2">
+            <a:extLst>
+              <a:ext uri="{28A0092B-C50C-407E-A947-70E740481C1C}">
+                <a14:useLocalDpi xmlns:a14="http://schemas.microsoft.com/office/drawing/2010/main" val="0"/>
+              </a:ext>
+            </a:extLst>
+          </a:blip>
+          <a:stretch>
+            <a:fillRect/>
+          </a:stretch>
+        </p:blipFill>
+        <p:spPr>
+          <a:xfrm>
+            <a:off x="536206" y="1226383"/>
+            <a:ext cx="11119587" cy="5406087"/>
+          </a:xfrm>
+          <a:prstGeom prst="rect">
+            <a:avLst/>
+          </a:prstGeom>
+        </p:spPr>
+      </p:pic>
+    </p:spTree>
+    <p:extLst>
+      <p:ext uri="{BB962C8B-B14F-4D97-AF65-F5344CB8AC3E}">
+        <p14:creationId xmlns:p14="http://schemas.microsoft.com/office/powerpoint/2010/main" val="3965164241"/>
+      </p:ext>
+    </p:extLst>
+  </p:cSld>
+  <p:clrMapOvr>
+    <a:masterClrMapping/>
+  </p:clrMapOvr>
+</p:sld>
+</file>
+
+<file path=ppt/slides/slide11.xml><?xml version="1.0" encoding="utf-8"?>
+<p:sld xmlns:a="http://schemas.openxmlformats.org/drawingml/2006/main" xmlns:r="http://schemas.openxmlformats.org/officeDocument/2006/relationships" xmlns:p="http://schemas.openxmlformats.org/presentationml/2006/main">
+  <p:cSld>
+    <p:spTree>
+      <p:nvGrpSpPr>
+        <p:cNvPr id="1" name=""/>
+        <p:cNvGrpSpPr/>
+        <p:nvPr/>
+      </p:nvGrpSpPr>
+      <p:grpSpPr>
+        <a:xfrm>
+          <a:off x="0" y="0"/>
+          <a:ext cx="0" cy="0"/>
+          <a:chOff x="0" y="0"/>
+          <a:chExt cx="0" cy="0"/>
+        </a:xfrm>
+      </p:grpSpPr>
+      <p:sp>
+        <p:nvSpPr>
+          <p:cNvPr id="8" name="Title 1">
+            <a:extLst>
+              <a:ext uri="{FF2B5EF4-FFF2-40B4-BE49-F238E27FC236}">
+                <a16:creationId xmlns:a16="http://schemas.microsoft.com/office/drawing/2014/main" id="{0BCDD50F-E0A2-46A4-825F-ADA7455816C7}"/>
+              </a:ext>
+            </a:extLst>
+          </p:cNvPr>
+          <p:cNvSpPr txBox="1">
+            <a:spLocks/>
+          </p:cNvSpPr>
+          <p:nvPr/>
+        </p:nvSpPr>
+        <p:spPr>
+          <a:xfrm>
+            <a:off x="227012" y="208822"/>
+            <a:ext cx="8001000" cy="1695450"/>
+          </a:xfrm>
+          <a:prstGeom prst="rect">
+            <a:avLst/>
+          </a:prstGeom>
+          <a:effectLst/>
+        </p:spPr>
+        <p:txBody>
+          <a:bodyPr vert="horz" lIns="91440" tIns="45720" rIns="91440" bIns="45720" rtlCol="0" anchor="t">
+            <a:normAutofit/>
+          </a:bodyPr>
+          <a:lstStyle>
+            <a:lvl1pPr algn="l" defTabSz="457200" rtl="0" eaLnBrk="1" latinLnBrk="0" hangingPunct="1">
+              <a:spcBef>
+                <a:spcPct val="0"/>
+              </a:spcBef>
+              <a:buNone/>
+              <a:defRPr sz="3600" kern="1200" cap="all">
+                <a:ln w="3175" cmpd="sng">
+                  <a:noFill/>
+                </a:ln>
+                <a:solidFill>
+                  <a:schemeClr val="tx1"/>
+                </a:solidFill>
+                <a:effectLst/>
+                <a:latin typeface="+mj-lt"/>
+                <a:ea typeface="+mj-ea"/>
+                <a:cs typeface="+mj-cs"/>
+              </a:defRPr>
+            </a:lvl1pPr>
+            <a:lvl2pPr eaLnBrk="1" hangingPunct="1">
+              <a:defRPr>
+                <a:solidFill>
+                  <a:schemeClr val="tx2"/>
+                </a:solidFill>
+              </a:defRPr>
+            </a:lvl2pPr>
+            <a:lvl3pPr eaLnBrk="1" hangingPunct="1">
+              <a:defRPr>
+                <a:solidFill>
+                  <a:schemeClr val="tx2"/>
+                </a:solidFill>
+              </a:defRPr>
+            </a:lvl3pPr>
+            <a:lvl4pPr eaLnBrk="1" hangingPunct="1">
+              <a:defRPr>
+                <a:solidFill>
+                  <a:schemeClr val="tx2"/>
+                </a:solidFill>
+              </a:defRPr>
+            </a:lvl4pPr>
+            <a:lvl5pPr eaLnBrk="1" hangingPunct="1">
+              <a:defRPr>
+                <a:solidFill>
+                  <a:schemeClr val="tx2"/>
+                </a:solidFill>
+              </a:defRPr>
+            </a:lvl5pPr>
+            <a:lvl6pPr eaLnBrk="1" hangingPunct="1">
+              <a:defRPr>
+                <a:solidFill>
+                  <a:schemeClr val="tx2"/>
+                </a:solidFill>
+              </a:defRPr>
+            </a:lvl6pPr>
+            <a:lvl7pPr eaLnBrk="1" hangingPunct="1">
+              <a:defRPr>
+                <a:solidFill>
+                  <a:schemeClr val="tx2"/>
+                </a:solidFill>
+              </a:defRPr>
+            </a:lvl7pPr>
+            <a:lvl8pPr eaLnBrk="1" hangingPunct="1">
+              <a:defRPr>
+                <a:solidFill>
+                  <a:schemeClr val="tx2"/>
+                </a:solidFill>
+              </a:defRPr>
+            </a:lvl8pPr>
+            <a:lvl9pPr eaLnBrk="1" hangingPunct="1">
+              <a:defRPr>
+                <a:solidFill>
+                  <a:schemeClr val="tx2"/>
+                </a:solidFill>
+              </a:defRPr>
+            </a:lvl9pPr>
+          </a:lstStyle>
+          <a:p>
+            <a:r>
+              <a:rPr lang="tr-TR" sz="4400" b="1" dirty="0"/>
+              <a:t>SCREENSHOTS</a:t>
+            </a:r>
+            <a:endParaRPr lang="tr-TR" sz="4800" b="1" dirty="0"/>
+          </a:p>
+        </p:txBody>
+      </p:sp>
+      <p:pic>
+        <p:nvPicPr>
+          <p:cNvPr id="3" name="Picture 2">
+            <a:extLst>
+              <a:ext uri="{FF2B5EF4-FFF2-40B4-BE49-F238E27FC236}">
+                <a16:creationId xmlns:a16="http://schemas.microsoft.com/office/drawing/2014/main" id="{B7F8B81C-CF44-4AA0-8D9C-35877859D7FC}"/>
+              </a:ext>
+            </a:extLst>
+          </p:cNvPr>
+          <p:cNvPicPr>
+            <a:picLocks noChangeAspect="1"/>
+          </p:cNvPicPr>
+          <p:nvPr/>
+        </p:nvPicPr>
+        <p:blipFill>
+          <a:blip r:embed="rId2">
+            <a:extLst>
+              <a:ext uri="{28A0092B-C50C-407E-A947-70E740481C1C}">
+                <a14:useLocalDpi xmlns:a14="http://schemas.microsoft.com/office/drawing/2010/main" val="0"/>
+              </a:ext>
+            </a:extLst>
+          </a:blip>
+          <a:stretch>
+            <a:fillRect/>
+          </a:stretch>
+        </p:blipFill>
+        <p:spPr>
+          <a:xfrm>
+            <a:off x="536206" y="1234236"/>
+            <a:ext cx="11119587" cy="5390381"/>
+          </a:xfrm>
+          <a:prstGeom prst="rect">
+            <a:avLst/>
+          </a:prstGeom>
+        </p:spPr>
+      </p:pic>
+    </p:spTree>
+    <p:extLst>
+      <p:ext uri="{BB962C8B-B14F-4D97-AF65-F5344CB8AC3E}">
+        <p14:creationId xmlns:p14="http://schemas.microsoft.com/office/powerpoint/2010/main" val="3384571277"/>
+      </p:ext>
+    </p:extLst>
+  </p:cSld>
+  <p:clrMapOvr>
+    <a:masterClrMapping/>
+  </p:clrMapOvr>
+</p:sld>
+</file>
+
+<file path=ppt/slides/slide12.xml><?xml version="1.0" encoding="utf-8"?>
+<p:sld xmlns:a="http://schemas.openxmlformats.org/drawingml/2006/main" xmlns:r="http://schemas.openxmlformats.org/officeDocument/2006/relationships" xmlns:p="http://schemas.openxmlformats.org/presentationml/2006/main">
+  <p:cSld>
+    <p:spTree>
+      <p:nvGrpSpPr>
+        <p:cNvPr id="1" name=""/>
+        <p:cNvGrpSpPr/>
+        <p:nvPr/>
+      </p:nvGrpSpPr>
+      <p:grpSpPr>
+        <a:xfrm>
+          <a:off x="0" y="0"/>
+          <a:ext cx="0" cy="0"/>
+          <a:chOff x="0" y="0"/>
+          <a:chExt cx="0" cy="0"/>
+        </a:xfrm>
+      </p:grpSpPr>
+      <p:sp>
+        <p:nvSpPr>
+          <p:cNvPr id="8" name="Title 1">
+            <a:extLst>
+              <a:ext uri="{FF2B5EF4-FFF2-40B4-BE49-F238E27FC236}">
+                <a16:creationId xmlns:a16="http://schemas.microsoft.com/office/drawing/2014/main" id="{0BCDD50F-E0A2-46A4-825F-ADA7455816C7}"/>
+              </a:ext>
+            </a:extLst>
+          </p:cNvPr>
+          <p:cNvSpPr txBox="1">
+            <a:spLocks/>
+          </p:cNvSpPr>
+          <p:nvPr/>
+        </p:nvSpPr>
+        <p:spPr>
+          <a:xfrm>
+            <a:off x="227012" y="208822"/>
+            <a:ext cx="8001000" cy="1695450"/>
+          </a:xfrm>
+          <a:prstGeom prst="rect">
+            <a:avLst/>
+          </a:prstGeom>
+          <a:effectLst/>
+        </p:spPr>
+        <p:txBody>
+          <a:bodyPr vert="horz" lIns="91440" tIns="45720" rIns="91440" bIns="45720" rtlCol="0" anchor="t">
+            <a:normAutofit/>
+          </a:bodyPr>
+          <a:lstStyle>
+            <a:lvl1pPr algn="l" defTabSz="457200" rtl="0" eaLnBrk="1" latinLnBrk="0" hangingPunct="1">
+              <a:spcBef>
+                <a:spcPct val="0"/>
+              </a:spcBef>
+              <a:buNone/>
+              <a:defRPr sz="3600" kern="1200" cap="all">
+                <a:ln w="3175" cmpd="sng">
+                  <a:noFill/>
+                </a:ln>
+                <a:solidFill>
+                  <a:schemeClr val="tx1"/>
+                </a:solidFill>
+                <a:effectLst/>
+                <a:latin typeface="+mj-lt"/>
+                <a:ea typeface="+mj-ea"/>
+                <a:cs typeface="+mj-cs"/>
+              </a:defRPr>
+            </a:lvl1pPr>
+            <a:lvl2pPr eaLnBrk="1" hangingPunct="1">
+              <a:defRPr>
+                <a:solidFill>
+                  <a:schemeClr val="tx2"/>
+                </a:solidFill>
+              </a:defRPr>
+            </a:lvl2pPr>
+            <a:lvl3pPr eaLnBrk="1" hangingPunct="1">
+              <a:defRPr>
+                <a:solidFill>
+                  <a:schemeClr val="tx2"/>
+                </a:solidFill>
+              </a:defRPr>
+            </a:lvl3pPr>
+            <a:lvl4pPr eaLnBrk="1" hangingPunct="1">
+              <a:defRPr>
+                <a:solidFill>
+                  <a:schemeClr val="tx2"/>
+                </a:solidFill>
+              </a:defRPr>
+            </a:lvl4pPr>
+            <a:lvl5pPr eaLnBrk="1" hangingPunct="1">
+              <a:defRPr>
+                <a:solidFill>
+                  <a:schemeClr val="tx2"/>
+                </a:solidFill>
+              </a:defRPr>
+            </a:lvl5pPr>
+            <a:lvl6pPr eaLnBrk="1" hangingPunct="1">
+              <a:defRPr>
+                <a:solidFill>
+                  <a:schemeClr val="tx2"/>
+                </a:solidFill>
+              </a:defRPr>
+            </a:lvl6pPr>
+            <a:lvl7pPr eaLnBrk="1" hangingPunct="1">
+              <a:defRPr>
+                <a:solidFill>
+                  <a:schemeClr val="tx2"/>
+                </a:solidFill>
+              </a:defRPr>
+            </a:lvl7pPr>
+            <a:lvl8pPr eaLnBrk="1" hangingPunct="1">
+              <a:defRPr>
+                <a:solidFill>
+                  <a:schemeClr val="tx2"/>
+                </a:solidFill>
+              </a:defRPr>
+            </a:lvl8pPr>
+            <a:lvl9pPr eaLnBrk="1" hangingPunct="1">
+              <a:defRPr>
+                <a:solidFill>
+                  <a:schemeClr val="tx2"/>
+                </a:solidFill>
+              </a:defRPr>
+            </a:lvl9pPr>
+          </a:lstStyle>
+          <a:p>
+            <a:r>
+              <a:rPr lang="tr-TR" sz="4400" b="1" dirty="0"/>
+              <a:t>SCREENSHOTS</a:t>
+            </a:r>
+            <a:endParaRPr lang="tr-TR" sz="4800" b="1" dirty="0"/>
+          </a:p>
+        </p:txBody>
+      </p:sp>
+      <p:pic>
+        <p:nvPicPr>
+          <p:cNvPr id="3" name="Picture 2">
+            <a:extLst>
+              <a:ext uri="{FF2B5EF4-FFF2-40B4-BE49-F238E27FC236}">
+                <a16:creationId xmlns:a16="http://schemas.microsoft.com/office/drawing/2014/main" id="{B7F8B81C-CF44-4AA0-8D9C-35877859D7FC}"/>
+              </a:ext>
+            </a:extLst>
+          </p:cNvPr>
+          <p:cNvPicPr>
+            <a:picLocks noChangeAspect="1"/>
+          </p:cNvPicPr>
+          <p:nvPr/>
+        </p:nvPicPr>
+        <p:blipFill>
+          <a:blip r:embed="rId2">
+            <a:extLst>
+              <a:ext uri="{28A0092B-C50C-407E-A947-70E740481C1C}">
+                <a14:useLocalDpi xmlns:a14="http://schemas.microsoft.com/office/drawing/2010/main" val="0"/>
+              </a:ext>
+            </a:extLst>
+          </a:blip>
+          <a:stretch>
+            <a:fillRect/>
+          </a:stretch>
+        </p:blipFill>
+        <p:spPr>
+          <a:xfrm>
+            <a:off x="536206" y="1227635"/>
+            <a:ext cx="11119587" cy="5403582"/>
+          </a:xfrm>
+          <a:prstGeom prst="rect">
+            <a:avLst/>
+          </a:prstGeom>
+        </p:spPr>
+      </p:pic>
+    </p:spTree>
+    <p:extLst>
+      <p:ext uri="{BB962C8B-B14F-4D97-AF65-F5344CB8AC3E}">
+        <p14:creationId xmlns:p14="http://schemas.microsoft.com/office/powerpoint/2010/main" val="269790260"/>
+      </p:ext>
+    </p:extLst>
+  </p:cSld>
+  <p:clrMapOvr>
+    <a:masterClrMapping/>
+  </p:clrMapOvr>
+</p:sld>
+</file>
+
 <file path=ppt/slides/slide2.xml><?xml version="1.0" encoding="utf-8"?>
 <p:sld xmlns:a="http://schemas.openxmlformats.org/drawingml/2006/main" xmlns:r="http://schemas.openxmlformats.org/officeDocument/2006/relationships" xmlns:p="http://schemas.openxmlformats.org/presentationml/2006/main">
   <p:cSld>
@@ -5671,7 +6212,152 @@
                   <a:schemeClr val="tx1"/>
                 </a:solidFill>
               </a:rPr>
-              <a:t>Create, Update, Delete operations are performed with admin privileges.</a:t>
+              <a:t>Create, Update, Delete operations are performed with </a:t>
+            </a:r>
+            <a:r>
+              <a:rPr lang="tr-TR" sz="2400" dirty="0" err="1">
+                <a:solidFill>
+                  <a:schemeClr val="tx1"/>
+                </a:solidFill>
+              </a:rPr>
+              <a:t>admin</a:t>
+            </a:r>
+            <a:r>
+              <a:rPr lang="tr-TR" sz="2400" dirty="0">
+                <a:solidFill>
+                  <a:schemeClr val="tx1"/>
+                </a:solidFill>
+              </a:rPr>
+              <a:t> </a:t>
+            </a:r>
+            <a:r>
+              <a:rPr lang="tr-TR" sz="2400" dirty="0" err="1">
+                <a:solidFill>
+                  <a:schemeClr val="tx1"/>
+                </a:solidFill>
+              </a:rPr>
+              <a:t>privileges</a:t>
+            </a:r>
+            <a:r>
+              <a:rPr lang="tr-TR" sz="2400" dirty="0">
+                <a:solidFill>
+                  <a:schemeClr val="tx1"/>
+                </a:solidFill>
+              </a:rPr>
+              <a:t>.</a:t>
+            </a:r>
+          </a:p>
+          <a:p>
+            <a:endParaRPr lang="tr-TR" sz="2400" dirty="0">
+              <a:solidFill>
+                <a:schemeClr val="tx1"/>
+              </a:solidFill>
+            </a:endParaRPr>
+          </a:p>
+          <a:p>
+            <a:r>
+              <a:rPr lang="tr-TR" sz="2400" dirty="0">
+                <a:solidFill>
+                  <a:schemeClr val="tx1"/>
+                </a:solidFill>
+              </a:rPr>
+              <a:t>Advanced </a:t>
+            </a:r>
+            <a:r>
+              <a:rPr lang="tr-TR" sz="2400" dirty="0" err="1">
+                <a:solidFill>
+                  <a:schemeClr val="tx1"/>
+                </a:solidFill>
+              </a:rPr>
+              <a:t>Search</a:t>
+            </a:r>
+            <a:r>
+              <a:rPr lang="tr-TR" sz="2400" dirty="0">
+                <a:solidFill>
+                  <a:schemeClr val="tx1"/>
+                </a:solidFill>
+              </a:rPr>
+              <a:t> </a:t>
+            </a:r>
+            <a:r>
+              <a:rPr lang="tr-TR" sz="2400" dirty="0" err="1">
+                <a:solidFill>
+                  <a:schemeClr val="tx1"/>
+                </a:solidFill>
+              </a:rPr>
+              <a:t>and</a:t>
+            </a:r>
+            <a:r>
+              <a:rPr lang="tr-TR" sz="2400" dirty="0">
+                <a:solidFill>
+                  <a:schemeClr val="tx1"/>
+                </a:solidFill>
+              </a:rPr>
+              <a:t> </a:t>
+            </a:r>
+            <a:r>
+              <a:rPr lang="tr-TR" sz="2400" dirty="0" err="1">
+                <a:solidFill>
+                  <a:schemeClr val="tx1"/>
+                </a:solidFill>
+              </a:rPr>
+              <a:t>detailed</a:t>
+            </a:r>
+            <a:r>
+              <a:rPr lang="tr-TR" sz="2400" dirty="0">
+                <a:solidFill>
+                  <a:schemeClr val="tx1"/>
+                </a:solidFill>
+              </a:rPr>
+              <a:t> </a:t>
+            </a:r>
+            <a:r>
+              <a:rPr lang="tr-TR" sz="2400" dirty="0" err="1">
+                <a:solidFill>
+                  <a:schemeClr val="tx1"/>
+                </a:solidFill>
+              </a:rPr>
+              <a:t>information</a:t>
+            </a:r>
+            <a:r>
+              <a:rPr lang="tr-TR" sz="2400" dirty="0">
+                <a:solidFill>
+                  <a:schemeClr val="tx1"/>
+                </a:solidFill>
+              </a:rPr>
+              <a:t> </a:t>
+            </a:r>
+            <a:r>
+              <a:rPr lang="tr-TR" sz="2400" dirty="0" err="1">
+                <a:solidFill>
+                  <a:schemeClr val="tx1"/>
+                </a:solidFill>
+              </a:rPr>
+              <a:t>for</a:t>
+            </a:r>
+            <a:r>
+              <a:rPr lang="tr-TR" sz="2400" dirty="0">
+                <a:solidFill>
+                  <a:schemeClr val="tx1"/>
+                </a:solidFill>
+              </a:rPr>
+              <a:t> </a:t>
+            </a:r>
+            <a:r>
+              <a:rPr lang="tr-TR" sz="2400" dirty="0" err="1">
+                <a:solidFill>
+                  <a:schemeClr val="tx1"/>
+                </a:solidFill>
+              </a:rPr>
+              <a:t>everyone</a:t>
+            </a:r>
+            <a:r>
+              <a:rPr lang="tr-TR" sz="2400" dirty="0">
+                <a:solidFill>
+                  <a:schemeClr val="tx1"/>
+                </a:solidFill>
+              </a:rPr>
+              <a:t>.</a:t>
             </a:r>
           </a:p>
         </p:txBody>
@@ -6885,6 +7571,185 @@
     <p:extLst>
       <p:ext uri="{BB962C8B-B14F-4D97-AF65-F5344CB8AC3E}">
         <p14:creationId xmlns:p14="http://schemas.microsoft.com/office/powerpoint/2010/main" val="2792100633"/>
+      </p:ext>
+    </p:extLst>
+  </p:cSld>
+  <p:clrMapOvr>
+    <a:masterClrMapping/>
+  </p:clrMapOvr>
+</p:sld>
+</file>
+
+<file path=ppt/slides/slide9.xml><?xml version="1.0" encoding="utf-8"?>
+<p:sld xmlns:a="http://schemas.openxmlformats.org/drawingml/2006/main" xmlns:r="http://schemas.openxmlformats.org/officeDocument/2006/relationships" xmlns:p="http://schemas.openxmlformats.org/presentationml/2006/main">
+  <p:cSld>
+    <p:spTree>
+      <p:nvGrpSpPr>
+        <p:cNvPr id="1" name=""/>
+        <p:cNvGrpSpPr/>
+        <p:nvPr/>
+      </p:nvGrpSpPr>
+      <p:grpSpPr>
+        <a:xfrm>
+          <a:off x="0" y="0"/>
+          <a:ext cx="0" cy="0"/>
+          <a:chOff x="0" y="0"/>
+          <a:chExt cx="0" cy="0"/>
+        </a:xfrm>
+      </p:grpSpPr>
+      <p:sp>
+        <p:nvSpPr>
+          <p:cNvPr id="8" name="Title 1">
+            <a:extLst>
+              <a:ext uri="{FF2B5EF4-FFF2-40B4-BE49-F238E27FC236}">
+                <a16:creationId xmlns:a16="http://schemas.microsoft.com/office/drawing/2014/main" id="{0BCDD50F-E0A2-46A4-825F-ADA7455816C7}"/>
+              </a:ext>
+            </a:extLst>
+          </p:cNvPr>
+          <p:cNvSpPr txBox="1">
+            <a:spLocks/>
+          </p:cNvSpPr>
+          <p:nvPr/>
+        </p:nvSpPr>
+        <p:spPr>
+          <a:xfrm>
+            <a:off x="227012" y="208822"/>
+            <a:ext cx="8001000" cy="1695450"/>
+          </a:xfrm>
+          <a:prstGeom prst="rect">
+            <a:avLst/>
+          </a:prstGeom>
+          <a:effectLst/>
+        </p:spPr>
+        <p:txBody>
+          <a:bodyPr vert="horz" lIns="91440" tIns="45720" rIns="91440" bIns="45720" rtlCol="0" anchor="t">
+            <a:normAutofit/>
+          </a:bodyPr>
+          <a:lstStyle>
+            <a:lvl1pPr algn="l" defTabSz="457200" rtl="0" eaLnBrk="1" latinLnBrk="0" hangingPunct="1">
+              <a:spcBef>
+                <a:spcPct val="0"/>
+              </a:spcBef>
+              <a:buNone/>
+              <a:defRPr sz="3600" kern="1200" cap="all">
+                <a:ln w="3175" cmpd="sng">
+                  <a:noFill/>
+                </a:ln>
+                <a:solidFill>
+                  <a:schemeClr val="tx1"/>
+                </a:solidFill>
+                <a:effectLst/>
+                <a:latin typeface="+mj-lt"/>
+                <a:ea typeface="+mj-ea"/>
+                <a:cs typeface="+mj-cs"/>
+              </a:defRPr>
+            </a:lvl1pPr>
+            <a:lvl2pPr eaLnBrk="1" hangingPunct="1">
+              <a:defRPr>
+                <a:solidFill>
+                  <a:schemeClr val="tx2"/>
+                </a:solidFill>
+              </a:defRPr>
+            </a:lvl2pPr>
+            <a:lvl3pPr eaLnBrk="1" hangingPunct="1">
+              <a:defRPr>
+                <a:solidFill>
+                  <a:schemeClr val="tx2"/>
+                </a:solidFill>
+              </a:defRPr>
+            </a:lvl3pPr>
+            <a:lvl4pPr eaLnBrk="1" hangingPunct="1">
+              <a:defRPr>
+                <a:solidFill>
+                  <a:schemeClr val="tx2"/>
+                </a:solidFill>
+              </a:defRPr>
+            </a:lvl4pPr>
+            <a:lvl5pPr eaLnBrk="1" hangingPunct="1">
+              <a:defRPr>
+                <a:solidFill>
+                  <a:schemeClr val="tx2"/>
+                </a:solidFill>
+              </a:defRPr>
+            </a:lvl5pPr>
+            <a:lvl6pPr eaLnBrk="1" hangingPunct="1">
+              <a:defRPr>
+                <a:solidFill>
+                  <a:schemeClr val="tx2"/>
+                </a:solidFill>
+              </a:defRPr>
+            </a:lvl6pPr>
+            <a:lvl7pPr eaLnBrk="1" hangingPunct="1">
+              <a:defRPr>
+                <a:solidFill>
+                  <a:schemeClr val="tx2"/>
+                </a:solidFill>
+              </a:defRPr>
+            </a:lvl7pPr>
+            <a:lvl8pPr eaLnBrk="1" hangingPunct="1">
+              <a:defRPr>
+                <a:solidFill>
+                  <a:schemeClr val="tx2"/>
+                </a:solidFill>
+              </a:defRPr>
+            </a:lvl8pPr>
+            <a:lvl9pPr eaLnBrk="1" hangingPunct="1">
+              <a:defRPr>
+                <a:solidFill>
+                  <a:schemeClr val="tx2"/>
+                </a:solidFill>
+              </a:defRPr>
+            </a:lvl9pPr>
+          </a:lstStyle>
+          <a:p>
+            <a:r>
+              <a:rPr lang="tr-TR" sz="4400" b="1" dirty="0"/>
+              <a:t>SCREENSHOTS</a:t>
+            </a:r>
+            <a:endParaRPr lang="tr-TR" sz="4800" b="1" dirty="0"/>
+          </a:p>
+        </p:txBody>
+      </p:sp>
+      <p:pic>
+        <p:nvPicPr>
+          <p:cNvPr id="3" name="Picture 2">
+            <a:extLst>
+              <a:ext uri="{FF2B5EF4-FFF2-40B4-BE49-F238E27FC236}">
+                <a16:creationId xmlns:a16="http://schemas.microsoft.com/office/drawing/2014/main" id="{B7F8B81C-CF44-4AA0-8D9C-35877859D7FC}"/>
+              </a:ext>
+            </a:extLst>
+          </p:cNvPr>
+          <p:cNvPicPr>
+            <a:picLocks noChangeAspect="1"/>
+          </p:cNvPicPr>
+          <p:nvPr/>
+        </p:nvPicPr>
+        <p:blipFill>
+          <a:blip r:embed="rId2">
+            <a:extLst>
+              <a:ext uri="{28A0092B-C50C-407E-A947-70E740481C1C}">
+                <a14:useLocalDpi xmlns:a14="http://schemas.microsoft.com/office/drawing/2010/main" val="0"/>
+              </a:ext>
+            </a:extLst>
+          </a:blip>
+          <a:stretch>
+            <a:fillRect/>
+          </a:stretch>
+        </p:blipFill>
+        <p:spPr>
+          <a:xfrm>
+            <a:off x="536206" y="1249321"/>
+            <a:ext cx="11119587" cy="5360211"/>
+          </a:xfrm>
+          <a:prstGeom prst="rect">
+            <a:avLst/>
+          </a:prstGeom>
+        </p:spPr>
+      </p:pic>
+    </p:spTree>
+    <p:extLst>
+      <p:ext uri="{BB962C8B-B14F-4D97-AF65-F5344CB8AC3E}">
+        <p14:creationId xmlns:p14="http://schemas.microsoft.com/office/powerpoint/2010/main" val="745801425"/>
       </p:ext>
     </p:extLst>
   </p:cSld>

</xml_diff>